<commit_message>
Minor change to slide 1
</commit_message>
<xml_diff>
--- a/1_HTML.pptx
+++ b/1_HTML.pptx
@@ -1356,11 +1356,7 @@
           <a:p>
             <a:r>
               <a:rPr lang="en-US" dirty="0"/>
-              <a:t>Form is </a:t>
-            </a:r>
-            <a:r>
-              <a:rPr lang="en-US"/>
-              <a:t>not tested</a:t>
+              <a:t>Form is not tested</a:t>
             </a:r>
           </a:p>
         </p:txBody>
@@ -1402,6 +1398,101 @@
 </file>
 
 <file path=ppt/notesSlides/notesSlide8.xml><?xml version="1.0" encoding="utf-8"?>
+<p:notes xmlns:a="http://schemas.openxmlformats.org/drawingml/2006/main" xmlns:r="http://schemas.openxmlformats.org/officeDocument/2006/relationships" xmlns:p="http://schemas.openxmlformats.org/presentationml/2006/main">
+  <p:cSld>
+    <p:spTree>
+      <p:nvGrpSpPr>
+        <p:cNvPr id="1" name=""/>
+        <p:cNvGrpSpPr/>
+        <p:nvPr/>
+      </p:nvGrpSpPr>
+      <p:grpSpPr>
+        <a:xfrm>
+          <a:off x="0" y="0"/>
+          <a:ext cx="0" cy="0"/>
+          <a:chOff x="0" y="0"/>
+          <a:chExt cx="0" cy="0"/>
+        </a:xfrm>
+      </p:grpSpPr>
+      <p:sp>
+        <p:nvSpPr>
+          <p:cNvPr id="2" name="Slide Image Placeholder 1"/>
+          <p:cNvSpPr>
+            <a:spLocks noGrp="1" noRot="1" noChangeAspect="1"/>
+          </p:cNvSpPr>
+          <p:nvPr>
+            <p:ph type="sldImg"/>
+          </p:nvPr>
+        </p:nvSpPr>
+        <p:spPr/>
+      </p:sp>
+      <p:sp>
+        <p:nvSpPr>
+          <p:cNvPr id="3" name="Notes Placeholder 2"/>
+          <p:cNvSpPr>
+            <a:spLocks noGrp="1"/>
+          </p:cNvSpPr>
+          <p:nvPr>
+            <p:ph type="body" idx="1"/>
+          </p:nvPr>
+        </p:nvSpPr>
+        <p:spPr/>
+        <p:txBody>
+          <a:bodyPr/>
+          <a:lstStyle/>
+          <a:p>
+            <a:r>
+              <a:rPr lang="en-US" dirty="0"/>
+              <a:t>Need to demo this with </a:t>
+            </a:r>
+            <a:r>
+              <a:rPr lang="en-US" dirty="0" err="1"/>
+              <a:t>console.log</a:t>
+            </a:r>
+            <a:r>
+              <a:rPr lang="en-US" dirty="0"/>
+              <a:t>() instead</a:t>
+            </a:r>
+          </a:p>
+        </p:txBody>
+      </p:sp>
+      <p:sp>
+        <p:nvSpPr>
+          <p:cNvPr id="4" name="Slide Number Placeholder 3"/>
+          <p:cNvSpPr>
+            <a:spLocks noGrp="1"/>
+          </p:cNvSpPr>
+          <p:nvPr>
+            <p:ph type="sldNum" sz="quarter" idx="5"/>
+          </p:nvPr>
+        </p:nvSpPr>
+        <p:spPr/>
+        <p:txBody>
+          <a:bodyPr/>
+          <a:lstStyle/>
+          <a:p>
+            <a:fld id="{96B84399-B9FB-2F4E-9D0A-A37DF58E964F}" type="slidenum">
+              <a:rPr lang="en-US" smtClean="0"/>
+              <a:t>31</a:t>
+            </a:fld>
+            <a:endParaRPr lang="en-US"/>
+          </a:p>
+        </p:txBody>
+      </p:sp>
+    </p:spTree>
+    <p:extLst>
+      <p:ext uri="{BB962C8B-B14F-4D97-AF65-F5344CB8AC3E}">
+        <p14:creationId xmlns:p14="http://schemas.microsoft.com/office/powerpoint/2010/main" val="2979492387"/>
+      </p:ext>
+    </p:extLst>
+  </p:cSld>
+  <p:clrMapOvr>
+    <a:masterClrMapping/>
+  </p:clrMapOvr>
+</p:notes>
+</file>
+
+<file path=ppt/notesSlides/notesSlide9.xml><?xml version="1.0" encoding="utf-8"?>
 <p:notes xmlns:a="http://schemas.openxmlformats.org/drawingml/2006/main" xmlns:r="http://schemas.openxmlformats.org/officeDocument/2006/relationships" xmlns:p="http://schemas.openxmlformats.org/presentationml/2006/main">
   <p:cSld>
     <p:spTree>
@@ -19137,7 +19228,7 @@
           <p:nvPr/>
         </p:nvPicPr>
         <p:blipFill>
-          <a:blip r:embed="rId2"/>
+          <a:blip r:embed="rId3"/>
           <a:stretch>
             <a:fillRect/>
           </a:stretch>
@@ -19154,7 +19245,7 @@
       </p:pic>
       <mc:AlternateContent xmlns:mc="http://schemas.openxmlformats.org/markup-compatibility/2006" xmlns:p14="http://schemas.microsoft.com/office/powerpoint/2010/main">
         <mc:Choice Requires="p14">
-          <p:contentPart p14:bwMode="auto" r:id="rId3">
+          <p:contentPart p14:bwMode="auto" r:id="rId4">
             <p14:nvContentPartPr>
               <p14:cNvPr id="6" name="Ink 5">
                 <a:extLst>
@@ -19186,7 +19277,7 @@
               <p:nvPr/>
             </p:nvPicPr>
             <p:blipFill>
-              <a:blip r:embed="rId4"/>
+              <a:blip r:embed="rId5"/>
               <a:stretch>
                 <a:fillRect/>
               </a:stretch>
@@ -19205,7 +19296,7 @@
       </mc:AlternateContent>
       <mc:AlternateContent xmlns:mc="http://schemas.openxmlformats.org/markup-compatibility/2006" xmlns:p14="http://schemas.microsoft.com/office/powerpoint/2010/main">
         <mc:Choice Requires="p14">
-          <p:contentPart p14:bwMode="auto" r:id="rId5">
+          <p:contentPart p14:bwMode="auto" r:id="rId6">
             <p14:nvContentPartPr>
               <p14:cNvPr id="7" name="Ink 6">
                 <a:extLst>
@@ -19237,7 +19328,7 @@
               <p:nvPr/>
             </p:nvPicPr>
             <p:blipFill>
-              <a:blip r:embed="rId6"/>
+              <a:blip r:embed="rId7"/>
               <a:stretch>
                 <a:fillRect/>
               </a:stretch>
@@ -20434,42 +20525,50 @@
             <a:r>
               <a:rPr lang="en-US" sz="1800" b="1" dirty="0">
                 <a:solidFill>
-                  <a:srgbClr val="00B04F"/>
-                </a:solidFill>
-              </a:rPr>
-              <a:t>selector.</a:t>
+                  <a:srgbClr val="C00000"/>
+                </a:solidFill>
+              </a:rPr>
+              <a:t>.</a:t>
+            </a:r>
+            <a:r>
+              <a:rPr lang="en-US" sz="1800" b="1" spc="-5" dirty="0" err="1">
+                <a:solidFill>
+                  <a:srgbClr val="FF0000"/>
+                </a:solidFill>
+              </a:rPr>
+              <a:t>classnam</a:t>
+            </a:r>
+            <a:r>
+              <a:rPr lang="en-US" sz="1800" b="1" dirty="0" err="1">
+                <a:solidFill>
+                  <a:srgbClr val="FF0000"/>
+                </a:solidFill>
+              </a:rPr>
+              <a:t>e</a:t>
+            </a:r>
+            <a:r>
+              <a:rPr lang="en-US" sz="1800" b="1" spc="5" dirty="0">
+                <a:solidFill>
+                  <a:srgbClr val="FF0000"/>
+                </a:solidFill>
+              </a:rPr>
+              <a:t> </a:t>
             </a:r>
             <a:r>
               <a:rPr lang="en-US" sz="1800" b="1" spc="-5" dirty="0">
                 <a:solidFill>
-                  <a:srgbClr val="00B04F"/>
-                </a:solidFill>
-              </a:rPr>
-              <a:t> </a:t>
-            </a:r>
-            <a:r>
-              <a:rPr lang="en-US" sz="1800" b="1" spc="-5" dirty="0" err="1">
-                <a:solidFill>
-                  <a:srgbClr val="FF0000"/>
-                </a:solidFill>
-              </a:rPr>
-              <a:t>classnam</a:t>
-            </a:r>
-            <a:r>
-              <a:rPr lang="en-US" sz="1800" b="1" dirty="0" err="1">
-                <a:solidFill>
-                  <a:srgbClr val="FF0000"/>
-                </a:solidFill>
-              </a:rPr>
-              <a:t>e</a:t>
-            </a:r>
-            <a:r>
-              <a:rPr lang="en-US" sz="1800" b="1" spc="5" dirty="0">
-                <a:solidFill>
-                  <a:srgbClr val="FF0000"/>
-                </a:solidFill>
-              </a:rPr>
-              <a:t> </a:t>
+                  <a:srgbClr val="0070C0"/>
+                </a:solidFill>
+              </a:rPr>
+              <a:t>{property1</a:t>
+            </a:r>
+            <a:r>
+              <a:rPr lang="en-US" sz="1800" b="1" dirty="0">
+                <a:solidFill>
+                  <a:srgbClr val="0070C0"/>
+                </a:solidFill>
+              </a:rPr>
+              <a:t>:</a:t>
             </a:r>
             <a:r>
               <a:rPr lang="en-US" sz="1800" b="1" spc="-5" dirty="0">
@@ -20477,7 +20576,7 @@
                   <a:srgbClr val="0070C0"/>
                 </a:solidFill>
               </a:rPr>
-              <a:t>{property1</a:t>
+              <a:t> value1</a:t>
             </a:r>
             <a:r>
               <a:rPr lang="en-US" sz="1800" b="1" dirty="0">
@@ -20485,7 +20584,7 @@
                   <a:srgbClr val="0070C0"/>
                 </a:solidFill>
               </a:rPr>
-              <a:t>:</a:t>
+              <a:t>;</a:t>
             </a:r>
             <a:r>
               <a:rPr lang="en-US" sz="1800" b="1" spc="-5" dirty="0">
@@ -20493,7 +20592,7 @@
                   <a:srgbClr val="0070C0"/>
                 </a:solidFill>
               </a:rPr>
-              <a:t> value1</a:t>
+              <a:t>  property2: </a:t>
             </a:r>
             <a:r>
               <a:rPr lang="en-US" sz="1800" b="1" dirty="0">
@@ -20501,23 +20600,7 @@
                   <a:srgbClr val="0070C0"/>
                 </a:solidFill>
               </a:rPr>
-              <a:t>;</a:t>
-            </a:r>
-            <a:r>
-              <a:rPr lang="en-US" sz="1800" b="1" spc="-5" dirty="0">
-                <a:solidFill>
-                  <a:srgbClr val="0070C0"/>
-                </a:solidFill>
-              </a:rPr>
-              <a:t>  property2: </a:t>
-            </a:r>
-            <a:r>
-              <a:rPr lang="en-US" sz="1800" b="1" dirty="0">
-                <a:solidFill>
-                  <a:srgbClr val="0070C0"/>
-                </a:solidFill>
-              </a:rPr>
-              <a:t>value2;}</a:t>
+              <a:t>value2;} </a:t>
             </a:r>
             <a:endParaRPr lang="en-US" sz="1800" dirty="0">
               <a:solidFill>
@@ -20540,15 +20623,15 @@
               <a:t>E.g.:  </a:t>
             </a:r>
             <a:r>
-              <a:rPr lang="en-US" sz="1800" dirty="0" err="1">
-                <a:solidFill>
-                  <a:srgbClr val="00B04F"/>
-                </a:solidFill>
-              </a:rPr>
-              <a:t>p.</a:t>
-            </a:r>
-            <a:r>
-              <a:rPr lang="en-US" sz="1800" spc="-5" dirty="0" err="1">
+              <a:rPr lang="en-US" sz="1800" dirty="0">
+                <a:solidFill>
+                  <a:srgbClr val="C00000"/>
+                </a:solidFill>
+              </a:rPr>
+              <a:t>.</a:t>
+            </a:r>
+            <a:r>
+              <a:rPr lang="en-US" sz="1800" spc="-5" dirty="0">
                 <a:solidFill>
                   <a:srgbClr val="FF0000"/>
                 </a:solidFill>
@@ -20556,20 +20639,12 @@
               <a:t>specia</a:t>
             </a:r>
             <a:r>
-              <a:rPr lang="en-US" sz="1800" dirty="0" err="1">
+              <a:rPr lang="en-US" sz="1800" dirty="0">
                 <a:solidFill>
                   <a:srgbClr val="FF0000"/>
                 </a:solidFill>
               </a:rPr>
-              <a:t>l</a:t>
-            </a:r>
-            <a:r>
-              <a:rPr lang="en-US" sz="1800" dirty="0">
-                <a:solidFill>
-                  <a:srgbClr val="FF0000"/>
-                </a:solidFill>
-              </a:rPr>
-              <a:t> </a:t>
+              <a:t>l </a:t>
             </a:r>
             <a:r>
               <a:rPr lang="en-US" sz="1800" dirty="0">
@@ -20808,7 +20883,15 @@
             </a:pPr>
             <a:r>
               <a:rPr lang="en-US" sz="2176" dirty="0"/>
-              <a:t>Similar syntax as class</a:t>
+              <a:t>Similar syntax as class, define with a </a:t>
+            </a:r>
+            <a:r>
+              <a:rPr lang="en-US" sz="2176" dirty="0">
+                <a:solidFill>
+                  <a:srgbClr val="C00000"/>
+                </a:solidFill>
+              </a:rPr>
+              <a:t>“#”</a:t>
             </a:r>
           </a:p>
           <a:p>
@@ -20823,23 +20906,7 @@
               </a:tabLst>
             </a:pPr>
             <a:r>
-              <a:rPr lang="en-US" sz="2539" b="1" spc="-9" dirty="0" err="1">
-                <a:solidFill>
-                  <a:srgbClr val="00B04F"/>
-                </a:solidFill>
-              </a:rPr>
-              <a:t>selecto</a:t>
-            </a:r>
-            <a:r>
-              <a:rPr lang="en-US" sz="2539" b="1" spc="-5" dirty="0" err="1">
-                <a:solidFill>
-                  <a:srgbClr val="00B04F"/>
-                </a:solidFill>
-              </a:rPr>
-              <a:t>r</a:t>
-            </a:r>
-            <a:r>
-              <a:rPr lang="en-US" sz="2539" b="1" spc="-5" dirty="0" err="1">
+              <a:rPr lang="en-US" sz="2539" b="1" spc="-5" dirty="0">
                 <a:solidFill>
                   <a:srgbClr val="FF0000"/>
                 </a:solidFill>

</xml_diff>

<commit_message>
minor changes to slide 1
</commit_message>
<xml_diff>
--- a/1_HTML.pptx
+++ b/1_HTML.pptx
@@ -5,46 +5,48 @@
     <p:sldMasterId id="2147483648" r:id="rId1"/>
   </p:sldMasterIdLst>
   <p:notesMasterIdLst>
-    <p:notesMasterId r:id="rId39"/>
+    <p:notesMasterId r:id="rId41"/>
   </p:notesMasterIdLst>
   <p:sldIdLst>
     <p:sldId id="256" r:id="rId2"/>
     <p:sldId id="257" r:id="rId3"/>
-    <p:sldId id="349" r:id="rId4"/>
-    <p:sldId id="258" r:id="rId5"/>
-    <p:sldId id="259" r:id="rId6"/>
-    <p:sldId id="260" r:id="rId7"/>
-    <p:sldId id="262" r:id="rId8"/>
-    <p:sldId id="268" r:id="rId9"/>
-    <p:sldId id="307" r:id="rId10"/>
-    <p:sldId id="275" r:id="rId11"/>
-    <p:sldId id="308" r:id="rId12"/>
-    <p:sldId id="277" r:id="rId13"/>
-    <p:sldId id="309" r:id="rId14"/>
-    <p:sldId id="310" r:id="rId15"/>
-    <p:sldId id="322" r:id="rId16"/>
-    <p:sldId id="323" r:id="rId17"/>
-    <p:sldId id="325" r:id="rId18"/>
-    <p:sldId id="324" r:id="rId19"/>
-    <p:sldId id="326" r:id="rId20"/>
-    <p:sldId id="348" r:id="rId21"/>
-    <p:sldId id="327" r:id="rId22"/>
-    <p:sldId id="328" r:id="rId23"/>
-    <p:sldId id="329" r:id="rId24"/>
-    <p:sldId id="286" r:id="rId25"/>
-    <p:sldId id="287" r:id="rId26"/>
-    <p:sldId id="279" r:id="rId27"/>
-    <p:sldId id="280" r:id="rId28"/>
-    <p:sldId id="281" r:id="rId29"/>
-    <p:sldId id="282" r:id="rId30"/>
-    <p:sldId id="330" r:id="rId31"/>
-    <p:sldId id="336" r:id="rId32"/>
-    <p:sldId id="311" r:id="rId33"/>
-    <p:sldId id="312" r:id="rId34"/>
-    <p:sldId id="313" r:id="rId35"/>
-    <p:sldId id="314" r:id="rId36"/>
-    <p:sldId id="319" r:id="rId37"/>
-    <p:sldId id="347" r:id="rId38"/>
+    <p:sldId id="350" r:id="rId4"/>
+    <p:sldId id="349" r:id="rId5"/>
+    <p:sldId id="258" r:id="rId6"/>
+    <p:sldId id="259" r:id="rId7"/>
+    <p:sldId id="260" r:id="rId8"/>
+    <p:sldId id="262" r:id="rId9"/>
+    <p:sldId id="268" r:id="rId10"/>
+    <p:sldId id="307" r:id="rId11"/>
+    <p:sldId id="275" r:id="rId12"/>
+    <p:sldId id="308" r:id="rId13"/>
+    <p:sldId id="277" r:id="rId14"/>
+    <p:sldId id="309" r:id="rId15"/>
+    <p:sldId id="310" r:id="rId16"/>
+    <p:sldId id="322" r:id="rId17"/>
+    <p:sldId id="323" r:id="rId18"/>
+    <p:sldId id="325" r:id="rId19"/>
+    <p:sldId id="324" r:id="rId20"/>
+    <p:sldId id="326" r:id="rId21"/>
+    <p:sldId id="348" r:id="rId22"/>
+    <p:sldId id="327" r:id="rId23"/>
+    <p:sldId id="328" r:id="rId24"/>
+    <p:sldId id="329" r:id="rId25"/>
+    <p:sldId id="286" r:id="rId26"/>
+    <p:sldId id="287" r:id="rId27"/>
+    <p:sldId id="279" r:id="rId28"/>
+    <p:sldId id="280" r:id="rId29"/>
+    <p:sldId id="281" r:id="rId30"/>
+    <p:sldId id="282" r:id="rId31"/>
+    <p:sldId id="330" r:id="rId32"/>
+    <p:sldId id="336" r:id="rId33"/>
+    <p:sldId id="311" r:id="rId34"/>
+    <p:sldId id="312" r:id="rId35"/>
+    <p:sldId id="313" r:id="rId36"/>
+    <p:sldId id="314" r:id="rId37"/>
+    <p:sldId id="319" r:id="rId38"/>
+    <p:sldId id="347" r:id="rId39"/>
+    <p:sldId id="351" r:id="rId40"/>
   </p:sldIdLst>
   <p:sldSz cx="12192000" cy="6858000"/>
   <p:notesSz cx="6858000" cy="9144000"/>
@@ -787,7 +789,7 @@
           <a:p>
             <a:fld id="{96B84399-B9FB-2F4E-9D0A-A37DF58E964F}" type="slidenum">
               <a:rPr lang="en-US" smtClean="0"/>
-              <a:t>5</a:t>
+              <a:t>6</a:t>
             </a:fld>
             <a:endParaRPr lang="en-US"/>
           </a:p>
@@ -892,7 +894,7 @@
           <a:p>
             <a:fld id="{96B84399-B9FB-2F4E-9D0A-A37DF58E964F}" type="slidenum">
               <a:rPr lang="en-US" smtClean="0"/>
-              <a:t>14</a:t>
+              <a:t>15</a:t>
             </a:fld>
             <a:endParaRPr lang="en-US"/>
           </a:p>
@@ -1000,7 +1002,7 @@
           <a:p>
             <a:fld id="{96B84399-B9FB-2F4E-9D0A-A37DF58E964F}" type="slidenum">
               <a:rPr lang="en-US" smtClean="0"/>
-              <a:t>15</a:t>
+              <a:t>16</a:t>
             </a:fld>
             <a:endParaRPr lang="en-US"/>
           </a:p>
@@ -1087,7 +1089,7 @@
           <a:p>
             <a:fld id="{96B84399-B9FB-2F4E-9D0A-A37DF58E964F}" type="slidenum">
               <a:rPr lang="en-US" smtClean="0"/>
-              <a:t>16</a:t>
+              <a:t>17</a:t>
             </a:fld>
             <a:endParaRPr lang="en-US"/>
           </a:p>
@@ -1207,7 +1209,7 @@
           <a:p>
             <a:fld id="{96B84399-B9FB-2F4E-9D0A-A37DF58E964F}" type="slidenum">
               <a:rPr lang="en-US" smtClean="0"/>
-              <a:t>19</a:t>
+              <a:t>20</a:t>
             </a:fld>
             <a:endParaRPr lang="en-US"/>
           </a:p>
@@ -1291,7 +1293,7 @@
           <a:p>
             <a:fld id="{96B84399-B9FB-2F4E-9D0A-A37DF58E964F}" type="slidenum">
               <a:rPr lang="en-US" smtClean="0"/>
-              <a:t>20</a:t>
+              <a:t>21</a:t>
             </a:fld>
             <a:endParaRPr lang="en-US"/>
           </a:p>
@@ -1378,7 +1380,7 @@
           <a:p>
             <a:fld id="{96B84399-B9FB-2F4E-9D0A-A37DF58E964F}" type="slidenum">
               <a:rPr lang="en-US" smtClean="0"/>
-              <a:t>26</a:t>
+              <a:t>27</a:t>
             </a:fld>
             <a:endParaRPr lang="en-US"/>
           </a:p>
@@ -1473,7 +1475,7 @@
           <a:p>
             <a:fld id="{96B84399-B9FB-2F4E-9D0A-A37DF58E964F}" type="slidenum">
               <a:rPr lang="en-US" smtClean="0"/>
-              <a:t>31</a:t>
+              <a:t>32</a:t>
             </a:fld>
             <a:endParaRPr lang="en-US"/>
           </a:p>
@@ -1568,7 +1570,7 @@
           <a:p>
             <a:fld id="{96B84399-B9FB-2F4E-9D0A-A37DF58E964F}" type="slidenum">
               <a:rPr lang="en-US" smtClean="0"/>
-              <a:t>34</a:t>
+              <a:t>35</a:t>
             </a:fld>
             <a:endParaRPr lang="en-US"/>
           </a:p>
@@ -5670,6 +5672,144 @@
       </p:grpSpPr>
       <p:sp>
         <p:nvSpPr>
+          <p:cNvPr id="2" name="Title 1">
+            <a:extLst>
+              <a:ext uri="{FF2B5EF4-FFF2-40B4-BE49-F238E27FC236}">
+                <a16:creationId xmlns:a16="http://schemas.microsoft.com/office/drawing/2014/main" id="{C830DE6B-7B18-4540-9CB8-57591715AEC7}"/>
+              </a:ext>
+            </a:extLst>
+          </p:cNvPr>
+          <p:cNvSpPr>
+            <a:spLocks noGrp="1"/>
+          </p:cNvSpPr>
+          <p:nvPr>
+            <p:ph type="title"/>
+          </p:nvPr>
+        </p:nvSpPr>
+        <p:spPr/>
+        <p:txBody>
+          <a:bodyPr/>
+          <a:lstStyle/>
+          <a:p>
+            <a:r>
+              <a:rPr lang="en-US" dirty="0"/>
+              <a:t>Resources</a:t>
+            </a:r>
+          </a:p>
+        </p:txBody>
+      </p:sp>
+      <p:sp>
+        <p:nvSpPr>
+          <p:cNvPr id="3" name="Content Placeholder 2">
+            <a:extLst>
+              <a:ext uri="{FF2B5EF4-FFF2-40B4-BE49-F238E27FC236}">
+                <a16:creationId xmlns:a16="http://schemas.microsoft.com/office/drawing/2014/main" id="{0CD1B559-2E43-4540-AC02-8BA39354E8EE}"/>
+              </a:ext>
+            </a:extLst>
+          </p:cNvPr>
+          <p:cNvSpPr>
+            <a:spLocks noGrp="1"/>
+          </p:cNvSpPr>
+          <p:nvPr>
+            <p:ph idx="1"/>
+          </p:nvPr>
+        </p:nvSpPr>
+        <p:spPr>
+          <a:xfrm>
+            <a:off x="1371599" y="1544596"/>
+            <a:ext cx="9984259" cy="3449436"/>
+          </a:xfrm>
+        </p:spPr>
+        <p:txBody>
+          <a:bodyPr/>
+          <a:lstStyle/>
+          <a:p>
+            <a:r>
+              <a:rPr lang="en-US" dirty="0"/>
+              <a:t>Online code editors:</a:t>
+            </a:r>
+          </a:p>
+          <a:p>
+            <a:pPr lvl="1"/>
+            <a:r>
+              <a:rPr lang="en-US" dirty="0" err="1"/>
+              <a:t>codepen.io</a:t>
+            </a:r>
+            <a:endParaRPr lang="en-US" dirty="0"/>
+          </a:p>
+          <a:p>
+            <a:pPr lvl="1"/>
+            <a:r>
+              <a:rPr lang="en-US" dirty="0" err="1"/>
+              <a:t>replit.com</a:t>
+            </a:r>
+            <a:endParaRPr lang="en-US" dirty="0"/>
+          </a:p>
+          <a:p>
+            <a:r>
+              <a:rPr lang="en-US" dirty="0"/>
+              <a:t>Documentation References:</a:t>
+            </a:r>
+          </a:p>
+          <a:p>
+            <a:pPr lvl="1"/>
+            <a:r>
+              <a:rPr lang="en-US" dirty="0"/>
+              <a:t>w3schools.com</a:t>
+            </a:r>
+          </a:p>
+          <a:p>
+            <a:pPr lvl="1"/>
+            <a:r>
+              <a:rPr lang="en-US" dirty="0" err="1"/>
+              <a:t>codecademy.com</a:t>
+            </a:r>
+            <a:endParaRPr lang="en-US" dirty="0"/>
+          </a:p>
+          <a:p>
+            <a:pPr lvl="1"/>
+            <a:r>
+              <a:rPr lang="en-US" dirty="0"/>
+              <a:t>MDN JS Web Docs</a:t>
+            </a:r>
+          </a:p>
+          <a:p>
+            <a:endParaRPr lang="en-US" dirty="0"/>
+          </a:p>
+        </p:txBody>
+      </p:sp>
+    </p:spTree>
+    <p:extLst>
+      <p:ext uri="{BB962C8B-B14F-4D97-AF65-F5344CB8AC3E}">
+        <p14:creationId xmlns:p14="http://schemas.microsoft.com/office/powerpoint/2010/main" val="816834961"/>
+      </p:ext>
+    </p:extLst>
+  </p:cSld>
+  <p:clrMapOvr>
+    <a:masterClrMapping/>
+  </p:clrMapOvr>
+</p:sld>
+</file>
+
+<file path=ppt/slides/slide11.xml><?xml version="1.0" encoding="utf-8"?>
+<p:sld xmlns:a="http://schemas.openxmlformats.org/drawingml/2006/main" xmlns:r="http://schemas.openxmlformats.org/officeDocument/2006/relationships" xmlns:p="http://schemas.openxmlformats.org/presentationml/2006/main">
+  <p:cSld>
+    <p:spTree>
+      <p:nvGrpSpPr>
+        <p:cNvPr id="1" name=""/>
+        <p:cNvGrpSpPr/>
+        <p:nvPr/>
+      </p:nvGrpSpPr>
+      <p:grpSpPr>
+        <a:xfrm>
+          <a:off x="0" y="0"/>
+          <a:ext cx="0" cy="0"/>
+          <a:chOff x="0" y="0"/>
+          <a:chExt cx="0" cy="0"/>
+        </a:xfrm>
+      </p:grpSpPr>
+      <p:sp>
+        <p:nvSpPr>
           <p:cNvPr id="3" name="object 3"/>
           <p:cNvSpPr txBox="1">
             <a:spLocks noGrp="1"/>
@@ -5799,7 +5939,7 @@
 </p:sld>
 </file>
 
-<file path=ppt/slides/slide11.xml><?xml version="1.0" encoding="utf-8"?>
+<file path=ppt/slides/slide12.xml><?xml version="1.0" encoding="utf-8"?>
 <p:sld xmlns:a="http://schemas.openxmlformats.org/drawingml/2006/main" xmlns:r="http://schemas.openxmlformats.org/officeDocument/2006/relationships" xmlns:p="http://schemas.openxmlformats.org/presentationml/2006/main">
   <p:cSld>
     <p:spTree>
@@ -6574,7 +6714,7 @@
 </p:sld>
 </file>
 
-<file path=ppt/slides/slide12.xml><?xml version="1.0" encoding="utf-8"?>
+<file path=ppt/slides/slide13.xml><?xml version="1.0" encoding="utf-8"?>
 <p:sld xmlns:a="http://schemas.openxmlformats.org/drawingml/2006/main" xmlns:r="http://schemas.openxmlformats.org/officeDocument/2006/relationships" xmlns:p="http://schemas.openxmlformats.org/presentationml/2006/main">
   <p:cSld>
     <p:spTree>
@@ -6803,7 +6943,7 @@
 </p:sld>
 </file>
 
-<file path=ppt/slides/slide13.xml><?xml version="1.0" encoding="utf-8"?>
+<file path=ppt/slides/slide14.xml><?xml version="1.0" encoding="utf-8"?>
 <p:sld xmlns:a="http://schemas.openxmlformats.org/drawingml/2006/main" xmlns:r="http://schemas.openxmlformats.org/officeDocument/2006/relationships" xmlns:p="http://schemas.openxmlformats.org/presentationml/2006/main">
   <p:cSld>
     <p:spTree>
@@ -6993,7 +7133,7 @@
 </p:sld>
 </file>
 
-<file path=ppt/slides/slide14.xml><?xml version="1.0" encoding="utf-8"?>
+<file path=ppt/slides/slide15.xml><?xml version="1.0" encoding="utf-8"?>
 <p:sld xmlns:a="http://schemas.openxmlformats.org/drawingml/2006/main" xmlns:r="http://schemas.openxmlformats.org/officeDocument/2006/relationships" xmlns:p="http://schemas.openxmlformats.org/presentationml/2006/main">
   <p:cSld>
     <p:spTree>
@@ -7577,7 +7717,7 @@
 </p:sld>
 </file>
 
-<file path=ppt/slides/slide15.xml><?xml version="1.0" encoding="utf-8"?>
+<file path=ppt/slides/slide16.xml><?xml version="1.0" encoding="utf-8"?>
 <p:sld xmlns:a="http://schemas.openxmlformats.org/drawingml/2006/main" xmlns:r="http://schemas.openxmlformats.org/officeDocument/2006/relationships" xmlns:p="http://schemas.openxmlformats.org/presentationml/2006/main">
   <p:cSld>
     <p:spTree>
@@ -7681,7 +7821,7 @@
 </p:sld>
 </file>
 
-<file path=ppt/slides/slide16.xml><?xml version="1.0" encoding="utf-8"?>
+<file path=ppt/slides/slide17.xml><?xml version="1.0" encoding="utf-8"?>
 <p:sld xmlns:a="http://schemas.openxmlformats.org/drawingml/2006/main" xmlns:r="http://schemas.openxmlformats.org/officeDocument/2006/relationships" xmlns:p="http://schemas.openxmlformats.org/presentationml/2006/main">
   <p:cSld>
     <p:spTree>
@@ -8250,7 +8390,7 @@
 </p:sld>
 </file>
 
-<file path=ppt/slides/slide17.xml><?xml version="1.0" encoding="utf-8"?>
+<file path=ppt/slides/slide18.xml><?xml version="1.0" encoding="utf-8"?>
 <p:sld xmlns:a="http://schemas.openxmlformats.org/drawingml/2006/main" xmlns:r="http://schemas.openxmlformats.org/officeDocument/2006/relationships" xmlns:p="http://schemas.openxmlformats.org/presentationml/2006/main">
   <p:cSld>
     <p:spTree>
@@ -8819,7 +8959,7 @@
 </p:sld>
 </file>
 
-<file path=ppt/slides/slide18.xml><?xml version="1.0" encoding="utf-8"?>
+<file path=ppt/slides/slide19.xml><?xml version="1.0" encoding="utf-8"?>
 <p:sld xmlns:a="http://schemas.openxmlformats.org/drawingml/2006/main" xmlns:r="http://schemas.openxmlformats.org/officeDocument/2006/relationships" xmlns:p="http://schemas.openxmlformats.org/presentationml/2006/main">
   <p:cSld>
     <p:spTree>
@@ -9411,7 +9551,248 @@
 </p:sld>
 </file>
 
-<file path=ppt/slides/slide19.xml><?xml version="1.0" encoding="utf-8"?>
+<file path=ppt/slides/slide2.xml><?xml version="1.0" encoding="utf-8"?>
+<p:sld xmlns:a="http://schemas.openxmlformats.org/drawingml/2006/main" xmlns:r="http://schemas.openxmlformats.org/officeDocument/2006/relationships" xmlns:p="http://schemas.openxmlformats.org/presentationml/2006/main">
+  <p:cSld>
+    <p:spTree>
+      <p:nvGrpSpPr>
+        <p:cNvPr id="1" name=""/>
+        <p:cNvGrpSpPr/>
+        <p:nvPr/>
+      </p:nvGrpSpPr>
+      <p:grpSpPr>
+        <a:xfrm>
+          <a:off x="0" y="0"/>
+          <a:ext cx="0" cy="0"/>
+          <a:chOff x="0" y="0"/>
+          <a:chExt cx="0" cy="0"/>
+        </a:xfrm>
+      </p:grpSpPr>
+      <p:sp>
+        <p:nvSpPr>
+          <p:cNvPr id="2" name="Title 1">
+            <a:extLst>
+              <a:ext uri="{FF2B5EF4-FFF2-40B4-BE49-F238E27FC236}">
+                <a16:creationId xmlns:a16="http://schemas.microsoft.com/office/drawing/2014/main" id="{7183A5F4-8314-744C-8316-B8CA1F412E56}"/>
+              </a:ext>
+            </a:extLst>
+          </p:cNvPr>
+          <p:cNvSpPr>
+            <a:spLocks noGrp="1"/>
+          </p:cNvSpPr>
+          <p:nvPr>
+            <p:ph type="title"/>
+          </p:nvPr>
+        </p:nvSpPr>
+        <p:spPr/>
+        <p:txBody>
+          <a:bodyPr/>
+          <a:lstStyle/>
+          <a:p>
+            <a:r>
+              <a:rPr lang="en-US" dirty="0"/>
+              <a:t>Course Structure</a:t>
+            </a:r>
+          </a:p>
+        </p:txBody>
+      </p:sp>
+      <p:sp>
+        <p:nvSpPr>
+          <p:cNvPr id="3" name="Content Placeholder 2">
+            <a:extLst>
+              <a:ext uri="{FF2B5EF4-FFF2-40B4-BE49-F238E27FC236}">
+                <a16:creationId xmlns:a16="http://schemas.microsoft.com/office/drawing/2014/main" id="{192A62EC-43C3-A241-97D8-34FACE45239C}"/>
+              </a:ext>
+            </a:extLst>
+          </p:cNvPr>
+          <p:cNvSpPr>
+            <a:spLocks noGrp="1"/>
+          </p:cNvSpPr>
+          <p:nvPr>
+            <p:ph idx="1"/>
+          </p:nvPr>
+        </p:nvSpPr>
+        <p:spPr/>
+        <p:txBody>
+          <a:bodyPr>
+            <a:normAutofit lnSpcReduction="10000"/>
+          </a:bodyPr>
+          <a:lstStyle/>
+          <a:p>
+            <a:pPr marL="755650" indent="-742950">
+              <a:lnSpc>
+                <a:spcPct val="150000"/>
+              </a:lnSpc>
+              <a:buFont typeface="+mj-lt"/>
+              <a:buAutoNum type="arabicPeriod"/>
+              <a:tabLst>
+                <a:tab pos="354330" algn="l"/>
+                <a:tab pos="2334895" algn="l"/>
+              </a:tabLst>
+            </a:pPr>
+            <a:r>
+              <a:rPr lang="en-US" sz="3600" b="1" i="1" spc="-5" dirty="0"/>
+              <a:t>Basics </a:t>
+            </a:r>
+            <a:r>
+              <a:rPr lang="en-US" sz="3600" b="1" i="1" dirty="0"/>
+              <a:t>of</a:t>
+            </a:r>
+            <a:r>
+              <a:rPr lang="en-US" sz="3600" b="1" i="1" spc="-5" dirty="0"/>
+              <a:t> </a:t>
+            </a:r>
+            <a:r>
+              <a:rPr lang="en-US" sz="3600" b="1" i="1" spc="-5" dirty="0">
+                <a:solidFill>
+                  <a:srgbClr val="C00000"/>
+                </a:solidFill>
+              </a:rPr>
+              <a:t>HTML</a:t>
+            </a:r>
+            <a:endParaRPr lang="en-US" sz="3600" b="1" i="1" dirty="0">
+              <a:solidFill>
+                <a:srgbClr val="C00000"/>
+              </a:solidFill>
+            </a:endParaRPr>
+          </a:p>
+          <a:p>
+            <a:pPr marL="755650" indent="-742950">
+              <a:lnSpc>
+                <a:spcPct val="150000"/>
+              </a:lnSpc>
+              <a:buFont typeface="+mj-lt"/>
+              <a:buAutoNum type="arabicPeriod"/>
+              <a:tabLst>
+                <a:tab pos="354330" algn="l"/>
+                <a:tab pos="2334895" algn="l"/>
+              </a:tabLst>
+            </a:pPr>
+            <a:r>
+              <a:rPr lang="en-US" sz="3600" b="1" i="1" spc="-5" dirty="0"/>
+              <a:t>Basics </a:t>
+            </a:r>
+            <a:r>
+              <a:rPr lang="en-US" sz="3600" b="1" i="1" dirty="0"/>
+              <a:t>of</a:t>
+            </a:r>
+            <a:r>
+              <a:rPr lang="en-US" sz="3600" b="1" i="1" spc="-5" dirty="0"/>
+              <a:t> </a:t>
+            </a:r>
+            <a:r>
+              <a:rPr lang="en-US" sz="3600" b="1" i="1" spc="-5" dirty="0">
+                <a:solidFill>
+                  <a:schemeClr val="accent2">
+                    <a:lumMod val="75000"/>
+                  </a:schemeClr>
+                </a:solidFill>
+              </a:rPr>
+              <a:t>CSS</a:t>
+            </a:r>
+            <a:endParaRPr lang="en-US" sz="3600" b="1" i="1" dirty="0">
+              <a:solidFill>
+                <a:schemeClr val="accent2">
+                  <a:lumMod val="75000"/>
+                </a:schemeClr>
+              </a:solidFill>
+            </a:endParaRPr>
+          </a:p>
+          <a:p>
+            <a:pPr marL="755650" indent="-742950">
+              <a:lnSpc>
+                <a:spcPct val="150000"/>
+              </a:lnSpc>
+              <a:buFont typeface="+mj-lt"/>
+              <a:buAutoNum type="arabicPeriod"/>
+              <a:tabLst>
+                <a:tab pos="354330" algn="l"/>
+                <a:tab pos="2144395" algn="l"/>
+              </a:tabLst>
+            </a:pPr>
+            <a:r>
+              <a:rPr lang="en-US" sz="3600" b="1" i="1" spc="-5" dirty="0"/>
+              <a:t>Basics </a:t>
+            </a:r>
+            <a:r>
+              <a:rPr lang="en-US" sz="3600" b="1" i="1" dirty="0"/>
+              <a:t>of </a:t>
+            </a:r>
+            <a:r>
+              <a:rPr lang="en-US" sz="3600" b="1" i="1" dirty="0">
+                <a:solidFill>
+                  <a:srgbClr val="0070C0"/>
+                </a:solidFill>
+              </a:rPr>
+              <a:t>J</a:t>
+            </a:r>
+            <a:r>
+              <a:rPr lang="en-US" sz="3600" b="1" i="1" spc="-5" dirty="0">
+                <a:solidFill>
+                  <a:srgbClr val="0070C0"/>
+                </a:solidFill>
+              </a:rPr>
+              <a:t>avaScrip</a:t>
+            </a:r>
+            <a:r>
+              <a:rPr lang="en-US" sz="3600" b="1" i="1" dirty="0">
+                <a:solidFill>
+                  <a:srgbClr val="0070C0"/>
+                </a:solidFill>
+              </a:rPr>
+              <a:t>t</a:t>
+            </a:r>
+          </a:p>
+          <a:p>
+            <a:pPr marL="755650" indent="-742950">
+              <a:lnSpc>
+                <a:spcPct val="150000"/>
+              </a:lnSpc>
+              <a:buFont typeface="+mj-lt"/>
+              <a:buAutoNum type="arabicPeriod"/>
+              <a:tabLst>
+                <a:tab pos="354330" algn="l"/>
+                <a:tab pos="2144395" algn="l"/>
+              </a:tabLst>
+            </a:pPr>
+            <a:r>
+              <a:rPr lang="en-US" sz="3600" b="1" i="1" spc="-5" dirty="0"/>
+              <a:t>Objects, Functions &amp; Conditionals</a:t>
+            </a:r>
+          </a:p>
+          <a:p>
+            <a:pPr marL="755650" indent="-742950">
+              <a:lnSpc>
+                <a:spcPct val="150000"/>
+              </a:lnSpc>
+              <a:buFont typeface="+mj-lt"/>
+              <a:buAutoNum type="arabicPeriod"/>
+              <a:tabLst>
+                <a:tab pos="354330" algn="l"/>
+                <a:tab pos="2144395" algn="l"/>
+              </a:tabLst>
+            </a:pPr>
+            <a:r>
+              <a:rPr lang="en-US" sz="3600" b="1" i="1" dirty="0"/>
+              <a:t>JavaScript Logics &amp; HTML functions</a:t>
+            </a:r>
+          </a:p>
+        </p:txBody>
+      </p:sp>
+    </p:spTree>
+    <p:extLst>
+      <p:ext uri="{BB962C8B-B14F-4D97-AF65-F5344CB8AC3E}">
+        <p14:creationId xmlns:p14="http://schemas.microsoft.com/office/powerpoint/2010/main" val="3481024486"/>
+      </p:ext>
+    </p:extLst>
+  </p:cSld>
+  <p:clrMapOvr>
+    <a:masterClrMapping/>
+  </p:clrMapOvr>
+</p:sld>
+</file>
+
+<file path=ppt/slides/slide20.xml><?xml version="1.0" encoding="utf-8"?>
 <p:sld xmlns:a="http://schemas.openxmlformats.org/drawingml/2006/main" xmlns:r="http://schemas.openxmlformats.org/officeDocument/2006/relationships" xmlns:p="http://schemas.openxmlformats.org/presentationml/2006/main">
   <p:cSld>
     <p:spTree>
@@ -11307,248 +11688,7 @@
 </p:sld>
 </file>
 
-<file path=ppt/slides/slide2.xml><?xml version="1.0" encoding="utf-8"?>
-<p:sld xmlns:a="http://schemas.openxmlformats.org/drawingml/2006/main" xmlns:r="http://schemas.openxmlformats.org/officeDocument/2006/relationships" xmlns:p="http://schemas.openxmlformats.org/presentationml/2006/main">
-  <p:cSld>
-    <p:spTree>
-      <p:nvGrpSpPr>
-        <p:cNvPr id="1" name=""/>
-        <p:cNvGrpSpPr/>
-        <p:nvPr/>
-      </p:nvGrpSpPr>
-      <p:grpSpPr>
-        <a:xfrm>
-          <a:off x="0" y="0"/>
-          <a:ext cx="0" cy="0"/>
-          <a:chOff x="0" y="0"/>
-          <a:chExt cx="0" cy="0"/>
-        </a:xfrm>
-      </p:grpSpPr>
-      <p:sp>
-        <p:nvSpPr>
-          <p:cNvPr id="2" name="Title 1">
-            <a:extLst>
-              <a:ext uri="{FF2B5EF4-FFF2-40B4-BE49-F238E27FC236}">
-                <a16:creationId xmlns:a16="http://schemas.microsoft.com/office/drawing/2014/main" id="{7183A5F4-8314-744C-8316-B8CA1F412E56}"/>
-              </a:ext>
-            </a:extLst>
-          </p:cNvPr>
-          <p:cNvSpPr>
-            <a:spLocks noGrp="1"/>
-          </p:cNvSpPr>
-          <p:nvPr>
-            <p:ph type="title"/>
-          </p:nvPr>
-        </p:nvSpPr>
-        <p:spPr/>
-        <p:txBody>
-          <a:bodyPr/>
-          <a:lstStyle/>
-          <a:p>
-            <a:r>
-              <a:rPr lang="en-US" dirty="0"/>
-              <a:t>Course Structure</a:t>
-            </a:r>
-          </a:p>
-        </p:txBody>
-      </p:sp>
-      <p:sp>
-        <p:nvSpPr>
-          <p:cNvPr id="3" name="Content Placeholder 2">
-            <a:extLst>
-              <a:ext uri="{FF2B5EF4-FFF2-40B4-BE49-F238E27FC236}">
-                <a16:creationId xmlns:a16="http://schemas.microsoft.com/office/drawing/2014/main" id="{192A62EC-43C3-A241-97D8-34FACE45239C}"/>
-              </a:ext>
-            </a:extLst>
-          </p:cNvPr>
-          <p:cNvSpPr>
-            <a:spLocks noGrp="1"/>
-          </p:cNvSpPr>
-          <p:nvPr>
-            <p:ph idx="1"/>
-          </p:nvPr>
-        </p:nvSpPr>
-        <p:spPr/>
-        <p:txBody>
-          <a:bodyPr>
-            <a:normAutofit lnSpcReduction="10000"/>
-          </a:bodyPr>
-          <a:lstStyle/>
-          <a:p>
-            <a:pPr marL="755650" indent="-742950">
-              <a:lnSpc>
-                <a:spcPct val="150000"/>
-              </a:lnSpc>
-              <a:buFont typeface="+mj-lt"/>
-              <a:buAutoNum type="arabicPeriod"/>
-              <a:tabLst>
-                <a:tab pos="354330" algn="l"/>
-                <a:tab pos="2334895" algn="l"/>
-              </a:tabLst>
-            </a:pPr>
-            <a:r>
-              <a:rPr lang="en-US" sz="3600" b="1" i="1" spc="-5" dirty="0"/>
-              <a:t>Basics </a:t>
-            </a:r>
-            <a:r>
-              <a:rPr lang="en-US" sz="3600" b="1" i="1" dirty="0"/>
-              <a:t>of</a:t>
-            </a:r>
-            <a:r>
-              <a:rPr lang="en-US" sz="3600" b="1" i="1" spc="-5" dirty="0"/>
-              <a:t> </a:t>
-            </a:r>
-            <a:r>
-              <a:rPr lang="en-US" sz="3600" b="1" i="1" spc="-5" dirty="0">
-                <a:solidFill>
-                  <a:srgbClr val="C00000"/>
-                </a:solidFill>
-              </a:rPr>
-              <a:t>HTML</a:t>
-            </a:r>
-            <a:endParaRPr lang="en-US" sz="3600" b="1" i="1" dirty="0">
-              <a:solidFill>
-                <a:srgbClr val="C00000"/>
-              </a:solidFill>
-            </a:endParaRPr>
-          </a:p>
-          <a:p>
-            <a:pPr marL="755650" indent="-742950">
-              <a:lnSpc>
-                <a:spcPct val="150000"/>
-              </a:lnSpc>
-              <a:buFont typeface="+mj-lt"/>
-              <a:buAutoNum type="arabicPeriod"/>
-              <a:tabLst>
-                <a:tab pos="354330" algn="l"/>
-                <a:tab pos="2334895" algn="l"/>
-              </a:tabLst>
-            </a:pPr>
-            <a:r>
-              <a:rPr lang="en-US" sz="3600" b="1" i="1" spc="-5" dirty="0"/>
-              <a:t>Basics </a:t>
-            </a:r>
-            <a:r>
-              <a:rPr lang="en-US" sz="3600" b="1" i="1" dirty="0"/>
-              <a:t>of</a:t>
-            </a:r>
-            <a:r>
-              <a:rPr lang="en-US" sz="3600" b="1" i="1" spc="-5" dirty="0"/>
-              <a:t> </a:t>
-            </a:r>
-            <a:r>
-              <a:rPr lang="en-US" sz="3600" b="1" i="1" spc="-5" dirty="0">
-                <a:solidFill>
-                  <a:schemeClr val="accent2">
-                    <a:lumMod val="75000"/>
-                  </a:schemeClr>
-                </a:solidFill>
-              </a:rPr>
-              <a:t>CSS</a:t>
-            </a:r>
-            <a:endParaRPr lang="en-US" sz="3600" b="1" i="1" dirty="0">
-              <a:solidFill>
-                <a:schemeClr val="accent2">
-                  <a:lumMod val="75000"/>
-                </a:schemeClr>
-              </a:solidFill>
-            </a:endParaRPr>
-          </a:p>
-          <a:p>
-            <a:pPr marL="755650" indent="-742950">
-              <a:lnSpc>
-                <a:spcPct val="150000"/>
-              </a:lnSpc>
-              <a:buFont typeface="+mj-lt"/>
-              <a:buAutoNum type="arabicPeriod"/>
-              <a:tabLst>
-                <a:tab pos="354330" algn="l"/>
-                <a:tab pos="2144395" algn="l"/>
-              </a:tabLst>
-            </a:pPr>
-            <a:r>
-              <a:rPr lang="en-US" sz="3600" b="1" i="1" spc="-5" dirty="0"/>
-              <a:t>Basics </a:t>
-            </a:r>
-            <a:r>
-              <a:rPr lang="en-US" sz="3600" b="1" i="1" dirty="0"/>
-              <a:t>of </a:t>
-            </a:r>
-            <a:r>
-              <a:rPr lang="en-US" sz="3600" b="1" i="1" dirty="0">
-                <a:solidFill>
-                  <a:srgbClr val="0070C0"/>
-                </a:solidFill>
-              </a:rPr>
-              <a:t>J</a:t>
-            </a:r>
-            <a:r>
-              <a:rPr lang="en-US" sz="3600" b="1" i="1" spc="-5" dirty="0">
-                <a:solidFill>
-                  <a:srgbClr val="0070C0"/>
-                </a:solidFill>
-              </a:rPr>
-              <a:t>avaScrip</a:t>
-            </a:r>
-            <a:r>
-              <a:rPr lang="en-US" sz="3600" b="1" i="1" dirty="0">
-                <a:solidFill>
-                  <a:srgbClr val="0070C0"/>
-                </a:solidFill>
-              </a:rPr>
-              <a:t>t</a:t>
-            </a:r>
-          </a:p>
-          <a:p>
-            <a:pPr marL="755650" indent="-742950">
-              <a:lnSpc>
-                <a:spcPct val="150000"/>
-              </a:lnSpc>
-              <a:buFont typeface="+mj-lt"/>
-              <a:buAutoNum type="arabicPeriod"/>
-              <a:tabLst>
-                <a:tab pos="354330" algn="l"/>
-                <a:tab pos="2144395" algn="l"/>
-              </a:tabLst>
-            </a:pPr>
-            <a:r>
-              <a:rPr lang="en-US" sz="3600" b="1" i="1" spc="-5" dirty="0"/>
-              <a:t>Objects, Functions &amp; Conditionals</a:t>
-            </a:r>
-          </a:p>
-          <a:p>
-            <a:pPr marL="755650" indent="-742950">
-              <a:lnSpc>
-                <a:spcPct val="150000"/>
-              </a:lnSpc>
-              <a:buFont typeface="+mj-lt"/>
-              <a:buAutoNum type="arabicPeriod"/>
-              <a:tabLst>
-                <a:tab pos="354330" algn="l"/>
-                <a:tab pos="2144395" algn="l"/>
-              </a:tabLst>
-            </a:pPr>
-            <a:r>
-              <a:rPr lang="en-US" sz="3600" b="1" i="1" dirty="0"/>
-              <a:t>JavaScript Logics &amp; HTML functions</a:t>
-            </a:r>
-          </a:p>
-        </p:txBody>
-      </p:sp>
-    </p:spTree>
-    <p:extLst>
-      <p:ext uri="{BB962C8B-B14F-4D97-AF65-F5344CB8AC3E}">
-        <p14:creationId xmlns:p14="http://schemas.microsoft.com/office/powerpoint/2010/main" val="3481024486"/>
-      </p:ext>
-    </p:extLst>
-  </p:cSld>
-  <p:clrMapOvr>
-    <a:masterClrMapping/>
-  </p:clrMapOvr>
-</p:sld>
-</file>
-
-<file path=ppt/slides/slide20.xml><?xml version="1.0" encoding="utf-8"?>
+<file path=ppt/slides/slide21.xml><?xml version="1.0" encoding="utf-8"?>
 <p:sld xmlns:a="http://schemas.openxmlformats.org/drawingml/2006/main" xmlns:r="http://schemas.openxmlformats.org/officeDocument/2006/relationships" xmlns:p="http://schemas.openxmlformats.org/presentationml/2006/main">
   <p:cSld>
     <p:spTree>
@@ -11712,7 +11852,7 @@
 </p:sld>
 </file>
 
-<file path=ppt/slides/slide21.xml><?xml version="1.0" encoding="utf-8"?>
+<file path=ppt/slides/slide22.xml><?xml version="1.0" encoding="utf-8"?>
 <p:sld xmlns:a="http://schemas.openxmlformats.org/drawingml/2006/main" xmlns:r="http://schemas.openxmlformats.org/officeDocument/2006/relationships" xmlns:p="http://schemas.openxmlformats.org/presentationml/2006/main">
   <p:cSld>
     <p:spTree>
@@ -11929,7 +12069,7 @@
 </p:sld>
 </file>
 
-<file path=ppt/slides/slide22.xml><?xml version="1.0" encoding="utf-8"?>
+<file path=ppt/slides/slide23.xml><?xml version="1.0" encoding="utf-8"?>
 <p:sld xmlns:a="http://schemas.openxmlformats.org/drawingml/2006/main" xmlns:r="http://schemas.openxmlformats.org/officeDocument/2006/relationships" xmlns:p="http://schemas.openxmlformats.org/presentationml/2006/main">
   <p:cSld>
     <p:spTree>
@@ -12309,7 +12449,7 @@
 </p:sld>
 </file>
 
-<file path=ppt/slides/slide23.xml><?xml version="1.0" encoding="utf-8"?>
+<file path=ppt/slides/slide24.xml><?xml version="1.0" encoding="utf-8"?>
 <p:sld xmlns:a="http://schemas.openxmlformats.org/drawingml/2006/main" xmlns:r="http://schemas.openxmlformats.org/officeDocument/2006/relationships" xmlns:p="http://schemas.openxmlformats.org/presentationml/2006/main">
   <p:cSld>
     <p:spTree>
@@ -12512,7 +12652,7 @@
 </p:sld>
 </file>
 
-<file path=ppt/slides/slide24.xml><?xml version="1.0" encoding="utf-8"?>
+<file path=ppt/slides/slide25.xml><?xml version="1.0" encoding="utf-8"?>
 <p:sld xmlns:a="http://schemas.openxmlformats.org/drawingml/2006/main" xmlns:r="http://schemas.openxmlformats.org/officeDocument/2006/relationships" xmlns:p="http://schemas.openxmlformats.org/presentationml/2006/main">
   <p:cSld>
     <p:spTree>
@@ -13225,7 +13365,7 @@
 </p:sld>
 </file>
 
-<file path=ppt/slides/slide25.xml><?xml version="1.0" encoding="utf-8"?>
+<file path=ppt/slides/slide26.xml><?xml version="1.0" encoding="utf-8"?>
 <p:sld xmlns:a="http://schemas.openxmlformats.org/drawingml/2006/main" xmlns:r="http://schemas.openxmlformats.org/officeDocument/2006/relationships" xmlns:p="http://schemas.openxmlformats.org/presentationml/2006/main">
   <p:cSld>
     <p:spTree>
@@ -14193,7 +14333,7 @@
 </p:sld>
 </file>
 
-<file path=ppt/slides/slide26.xml><?xml version="1.0" encoding="utf-8"?>
+<file path=ppt/slides/slide27.xml><?xml version="1.0" encoding="utf-8"?>
 <p:sld xmlns:a="http://schemas.openxmlformats.org/drawingml/2006/main" xmlns:r="http://schemas.openxmlformats.org/officeDocument/2006/relationships" xmlns:p="http://schemas.openxmlformats.org/presentationml/2006/main">
   <p:cSld>
     <p:spTree>
@@ -15334,7 +15474,7 @@
 </p:sld>
 </file>
 
-<file path=ppt/slides/slide27.xml><?xml version="1.0" encoding="utf-8"?>
+<file path=ppt/slides/slide28.xml><?xml version="1.0" encoding="utf-8"?>
 <p:sld xmlns:a="http://schemas.openxmlformats.org/drawingml/2006/main" xmlns:r="http://schemas.openxmlformats.org/officeDocument/2006/relationships" xmlns:p="http://schemas.openxmlformats.org/presentationml/2006/main">
   <p:cSld>
     <p:spTree>
@@ -15607,7 +15747,7 @@
 </p:sld>
 </file>
 
-<file path=ppt/slides/slide28.xml><?xml version="1.0" encoding="utf-8"?>
+<file path=ppt/slides/slide29.xml><?xml version="1.0" encoding="utf-8"?>
 <p:sld xmlns:a="http://schemas.openxmlformats.org/drawingml/2006/main" xmlns:r="http://schemas.openxmlformats.org/officeDocument/2006/relationships" xmlns:p="http://schemas.openxmlformats.org/presentationml/2006/main">
   <p:cSld>
     <p:spTree>
@@ -16086,7 +16226,158 @@
 </p:sld>
 </file>
 
-<file path=ppt/slides/slide29.xml><?xml version="1.0" encoding="utf-8"?>
+<file path=ppt/slides/slide3.xml><?xml version="1.0" encoding="utf-8"?>
+<p:sld xmlns:a="http://schemas.openxmlformats.org/drawingml/2006/main" xmlns:r="http://schemas.openxmlformats.org/officeDocument/2006/relationships" xmlns:p="http://schemas.openxmlformats.org/presentationml/2006/main">
+  <p:cSld>
+    <p:spTree>
+      <p:nvGrpSpPr>
+        <p:cNvPr id="1" name=""/>
+        <p:cNvGrpSpPr/>
+        <p:nvPr/>
+      </p:nvGrpSpPr>
+      <p:grpSpPr>
+        <a:xfrm>
+          <a:off x="0" y="0"/>
+          <a:ext cx="0" cy="0"/>
+          <a:chOff x="0" y="0"/>
+          <a:chExt cx="0" cy="0"/>
+        </a:xfrm>
+      </p:grpSpPr>
+      <p:sp>
+        <p:nvSpPr>
+          <p:cNvPr id="2" name="Title 1">
+            <a:extLst>
+              <a:ext uri="{FF2B5EF4-FFF2-40B4-BE49-F238E27FC236}">
+                <a16:creationId xmlns:a16="http://schemas.microsoft.com/office/drawing/2014/main" id="{50AA924F-69C8-5949-BA6F-8DCA03BA5F12}"/>
+              </a:ext>
+            </a:extLst>
+          </p:cNvPr>
+          <p:cNvSpPr>
+            <a:spLocks noGrp="1"/>
+          </p:cNvSpPr>
+          <p:nvPr>
+            <p:ph type="title"/>
+          </p:nvPr>
+        </p:nvSpPr>
+        <p:spPr/>
+        <p:txBody>
+          <a:bodyPr/>
+          <a:lstStyle/>
+          <a:p>
+            <a:r>
+              <a:rPr lang="en-US" dirty="0"/>
+              <a:t>To Learn This Course Well</a:t>
+            </a:r>
+          </a:p>
+        </p:txBody>
+      </p:sp>
+      <p:sp>
+        <p:nvSpPr>
+          <p:cNvPr id="3" name="Content Placeholder 2">
+            <a:extLst>
+              <a:ext uri="{FF2B5EF4-FFF2-40B4-BE49-F238E27FC236}">
+                <a16:creationId xmlns:a16="http://schemas.microsoft.com/office/drawing/2014/main" id="{778A8116-2F38-2340-8DCE-783F88C7D121}"/>
+              </a:ext>
+            </a:extLst>
+          </p:cNvPr>
+          <p:cNvSpPr>
+            <a:spLocks noGrp="1"/>
+          </p:cNvSpPr>
+          <p:nvPr>
+            <p:ph idx="1"/>
+          </p:nvPr>
+        </p:nvSpPr>
+        <p:spPr/>
+        <p:txBody>
+          <a:bodyPr>
+            <a:normAutofit/>
+          </a:bodyPr>
+          <a:lstStyle/>
+          <a:p>
+            <a:pPr marL="457200" indent="-457200">
+              <a:lnSpc>
+                <a:spcPct val="150000"/>
+              </a:lnSpc>
+              <a:buFont typeface="+mj-lt"/>
+              <a:buAutoNum type="arabicPeriod"/>
+            </a:pPr>
+            <a:r>
+              <a:rPr lang="en-US" sz="3600" dirty="0"/>
+              <a:t>Follow the demonstration and code with me</a:t>
+            </a:r>
+          </a:p>
+          <a:p>
+            <a:pPr marL="457200" indent="-457200">
+              <a:lnSpc>
+                <a:spcPct val="150000"/>
+              </a:lnSpc>
+              <a:buFont typeface="+mj-lt"/>
+              <a:buAutoNum type="arabicPeriod"/>
+            </a:pPr>
+            <a:r>
+              <a:rPr lang="en-US" sz="3600" dirty="0"/>
+              <a:t>Try out and submit </a:t>
+            </a:r>
+            <a:r>
+              <a:rPr lang="en-US" sz="3600" b="1" dirty="0"/>
+              <a:t>3 In-Class Exercises</a:t>
+            </a:r>
+          </a:p>
+          <a:p>
+            <a:pPr marL="457200" indent="-457200">
+              <a:lnSpc>
+                <a:spcPct val="150000"/>
+              </a:lnSpc>
+              <a:buFont typeface="+mj-lt"/>
+              <a:buAutoNum type="arabicPeriod"/>
+            </a:pPr>
+            <a:r>
+              <a:rPr lang="en-US" sz="3600" dirty="0"/>
+              <a:t>Final Assessment:</a:t>
+            </a:r>
+          </a:p>
+          <a:p>
+            <a:pPr marL="987552" lvl="1" indent="-457200">
+              <a:lnSpc>
+                <a:spcPct val="150000"/>
+              </a:lnSpc>
+              <a:buFont typeface="+mj-lt"/>
+              <a:buAutoNum type="arabicParenR"/>
+            </a:pPr>
+            <a:r>
+              <a:rPr lang="en-US" sz="3600" b="1" dirty="0"/>
+              <a:t>Quiz</a:t>
+            </a:r>
+          </a:p>
+          <a:p>
+            <a:pPr marL="987552" lvl="1" indent="-457200">
+              <a:lnSpc>
+                <a:spcPct val="150000"/>
+              </a:lnSpc>
+              <a:buFont typeface="+mj-lt"/>
+              <a:buAutoNum type="arabicParenR"/>
+            </a:pPr>
+            <a:r>
+              <a:rPr lang="en-US" sz="3600" b="1" dirty="0"/>
+              <a:t>Assignment</a:t>
+            </a:r>
+          </a:p>
+        </p:txBody>
+      </p:sp>
+    </p:spTree>
+    <p:extLst>
+      <p:ext uri="{BB962C8B-B14F-4D97-AF65-F5344CB8AC3E}">
+        <p14:creationId xmlns:p14="http://schemas.microsoft.com/office/powerpoint/2010/main" val="3779564974"/>
+      </p:ext>
+    </p:extLst>
+  </p:cSld>
+  <p:clrMapOvr>
+    <a:masterClrMapping/>
+  </p:clrMapOvr>
+</p:sld>
+</file>
+
+<file path=ppt/slides/slide30.xml><?xml version="1.0" encoding="utf-8"?>
 <p:sld xmlns:a="http://schemas.openxmlformats.org/drawingml/2006/main" xmlns:r="http://schemas.openxmlformats.org/officeDocument/2006/relationships" xmlns:p="http://schemas.openxmlformats.org/presentationml/2006/main">
   <p:cSld>
     <p:spTree>
@@ -18806,91 +19097,7 @@
 </p:sld>
 </file>
 
-<file path=ppt/slides/slide3.xml><?xml version="1.0" encoding="utf-8"?>
-<p:sld xmlns:a="http://schemas.openxmlformats.org/drawingml/2006/main" xmlns:r="http://schemas.openxmlformats.org/officeDocument/2006/relationships" xmlns:p="http://schemas.openxmlformats.org/presentationml/2006/main">
-  <p:cSld>
-    <p:spTree>
-      <p:nvGrpSpPr>
-        <p:cNvPr id="1" name=""/>
-        <p:cNvGrpSpPr/>
-        <p:nvPr/>
-      </p:nvGrpSpPr>
-      <p:grpSpPr>
-        <a:xfrm>
-          <a:off x="0" y="0"/>
-          <a:ext cx="0" cy="0"/>
-          <a:chOff x="0" y="0"/>
-          <a:chExt cx="0" cy="0"/>
-        </a:xfrm>
-      </p:grpSpPr>
-      <p:sp>
-        <p:nvSpPr>
-          <p:cNvPr id="2" name="Title 1">
-            <a:extLst>
-              <a:ext uri="{FF2B5EF4-FFF2-40B4-BE49-F238E27FC236}">
-                <a16:creationId xmlns:a16="http://schemas.microsoft.com/office/drawing/2014/main" id="{98B80CAB-37EE-924F-937C-DFCA60B8A2EB}"/>
-              </a:ext>
-            </a:extLst>
-          </p:cNvPr>
-          <p:cNvSpPr>
-            <a:spLocks noGrp="1"/>
-          </p:cNvSpPr>
-          <p:nvPr>
-            <p:ph type="title"/>
-          </p:nvPr>
-        </p:nvSpPr>
-        <p:spPr/>
-        <p:txBody>
-          <a:bodyPr/>
-          <a:lstStyle/>
-          <a:p>
-            <a:endParaRPr lang="en-US"/>
-          </a:p>
-        </p:txBody>
-      </p:sp>
-      <p:pic>
-        <p:nvPicPr>
-          <p:cNvPr id="4" name="Content Placeholder 3">
-            <a:extLst>
-              <a:ext uri="{FF2B5EF4-FFF2-40B4-BE49-F238E27FC236}">
-                <a16:creationId xmlns:a16="http://schemas.microsoft.com/office/drawing/2014/main" id="{B8B71D6C-A802-B14D-AB45-7743BECA486F}"/>
-              </a:ext>
-            </a:extLst>
-          </p:cNvPr>
-          <p:cNvPicPr>
-            <a:picLocks noGrp="1" noChangeAspect="1"/>
-          </p:cNvPicPr>
-          <p:nvPr>
-            <p:ph idx="1"/>
-          </p:nvPr>
-        </p:nvPicPr>
-        <p:blipFill>
-          <a:blip r:embed="rId2"/>
-          <a:stretch>
-            <a:fillRect/>
-          </a:stretch>
-        </p:blipFill>
-        <p:spPr>
-          <a:xfrm>
-            <a:off x="3534911" y="877260"/>
-            <a:ext cx="5657166" cy="4627562"/>
-          </a:xfrm>
-        </p:spPr>
-      </p:pic>
-    </p:spTree>
-    <p:extLst>
-      <p:ext uri="{BB962C8B-B14F-4D97-AF65-F5344CB8AC3E}">
-        <p14:creationId xmlns:p14="http://schemas.microsoft.com/office/powerpoint/2010/main" val="3429237179"/>
-      </p:ext>
-    </p:extLst>
-  </p:cSld>
-  <p:clrMapOvr>
-    <a:masterClrMapping/>
-  </p:clrMapOvr>
-</p:sld>
-</file>
-
-<file path=ppt/slides/slide30.xml><?xml version="1.0" encoding="utf-8"?>
+<file path=ppt/slides/slide31.xml><?xml version="1.0" encoding="utf-8"?>
 <p:sld xmlns:a="http://schemas.openxmlformats.org/drawingml/2006/main" xmlns:r="http://schemas.openxmlformats.org/officeDocument/2006/relationships" xmlns:p="http://schemas.openxmlformats.org/presentationml/2006/main">
   <p:cSld>
     <p:spTree>
@@ -19117,7 +19324,7 @@
 </p:sld>
 </file>
 
-<file path=ppt/slides/slide31.xml><?xml version="1.0" encoding="utf-8"?>
+<file path=ppt/slides/slide32.xml><?xml version="1.0" encoding="utf-8"?>
 <p:sld xmlns:a="http://schemas.openxmlformats.org/drawingml/2006/main" xmlns:r="http://schemas.openxmlformats.org/officeDocument/2006/relationships" xmlns:p="http://schemas.openxmlformats.org/presentationml/2006/main">
   <p:cSld>
     <p:spTree>
@@ -19358,7 +19565,7 @@
 </p:sld>
 </file>
 
-<file path=ppt/slides/slide32.xml><?xml version="1.0" encoding="utf-8"?>
+<file path=ppt/slides/slide33.xml><?xml version="1.0" encoding="utf-8"?>
 <p:sld xmlns:a="http://schemas.openxmlformats.org/drawingml/2006/main" xmlns:r="http://schemas.openxmlformats.org/officeDocument/2006/relationships" xmlns:p="http://schemas.openxmlformats.org/presentationml/2006/main">
   <p:cSld>
     <p:spTree>
@@ -19539,7 +19746,7 @@
 </p:sld>
 </file>
 
-<file path=ppt/slides/slide33.xml><?xml version="1.0" encoding="utf-8"?>
+<file path=ppt/slides/slide34.xml><?xml version="1.0" encoding="utf-8"?>
 <p:sld xmlns:a="http://schemas.openxmlformats.org/drawingml/2006/main" xmlns:r="http://schemas.openxmlformats.org/officeDocument/2006/relationships" xmlns:p="http://schemas.openxmlformats.org/presentationml/2006/main">
   <p:cSld>
     <p:spTree>
@@ -20156,7 +20363,7 @@
 </p:sld>
 </file>
 
-<file path=ppt/slides/slide34.xml><?xml version="1.0" encoding="utf-8"?>
+<file path=ppt/slides/slide35.xml><?xml version="1.0" encoding="utf-8"?>
 <p:sld xmlns:a="http://schemas.openxmlformats.org/drawingml/2006/main" xmlns:r="http://schemas.openxmlformats.org/officeDocument/2006/relationships" xmlns:p="http://schemas.openxmlformats.org/presentationml/2006/main">
   <p:cSld>
     <p:spTree>
@@ -20681,7 +20888,7 @@
 </p:sld>
 </file>
 
-<file path=ppt/slides/slide35.xml><?xml version="1.0" encoding="utf-8"?>
+<file path=ppt/slides/slide36.xml><?xml version="1.0" encoding="utf-8"?>
 <p:sld xmlns:a="http://schemas.openxmlformats.org/drawingml/2006/main" xmlns:r="http://schemas.openxmlformats.org/officeDocument/2006/relationships" xmlns:p="http://schemas.openxmlformats.org/presentationml/2006/main">
   <p:cSld>
     <p:spTree>
@@ -21516,7 +21723,7 @@
 </p:sld>
 </file>
 
-<file path=ppt/slides/slide36.xml><?xml version="1.0" encoding="utf-8"?>
+<file path=ppt/slides/slide37.xml><?xml version="1.0" encoding="utf-8"?>
 <p:sld xmlns:a="http://schemas.openxmlformats.org/drawingml/2006/main" xmlns:r="http://schemas.openxmlformats.org/officeDocument/2006/relationships" xmlns:p="http://schemas.openxmlformats.org/presentationml/2006/main">
   <p:cSld>
     <p:spTree>
@@ -21580,7 +21787,7 @@
 </p:sld>
 </file>
 
-<file path=ppt/slides/slide37.xml><?xml version="1.0" encoding="utf-8"?>
+<file path=ppt/slides/slide38.xml><?xml version="1.0" encoding="utf-8"?>
 <p:sld xmlns:a="http://schemas.openxmlformats.org/drawingml/2006/main" xmlns:r="http://schemas.openxmlformats.org/officeDocument/2006/relationships" xmlns:p="http://schemas.openxmlformats.org/presentationml/2006/main">
   <p:cSld>
     <p:spTree>
@@ -21698,7 +21905,7 @@
         </p:nvSpPr>
         <p:spPr>
           <a:xfrm>
-            <a:off x="1651000" y="2262753"/>
+            <a:off x="1651000" y="1711593"/>
             <a:ext cx="4445000" cy="2677656"/>
           </a:xfrm>
           <a:prstGeom prst="rect">
@@ -21811,6 +22018,95 @@
               </a:rPr>
               <a:t>&gt;</a:t>
             </a:r>
+          </a:p>
+        </p:txBody>
+      </p:sp>
+      <p:sp>
+        <p:nvSpPr>
+          <p:cNvPr id="3" name="TextBox 2">
+            <a:extLst>
+              <a:ext uri="{FF2B5EF4-FFF2-40B4-BE49-F238E27FC236}">
+                <a16:creationId xmlns:a16="http://schemas.microsoft.com/office/drawing/2014/main" id="{80F5C47D-D43E-8D4E-B3E6-77E42D077B25}"/>
+              </a:ext>
+            </a:extLst>
+          </p:cNvPr>
+          <p:cNvSpPr txBox="1"/>
+          <p:nvPr/>
+        </p:nvSpPr>
+        <p:spPr>
+          <a:xfrm>
+            <a:off x="1371598" y="4837433"/>
+            <a:ext cx="4724401" cy="1446550"/>
+          </a:xfrm>
+          <a:prstGeom prst="rect">
+            <a:avLst/>
+          </a:prstGeom>
+          <a:noFill/>
+        </p:spPr>
+        <p:txBody>
+          <a:bodyPr wrap="square" rtlCol="0">
+            <a:spAutoFit/>
+          </a:bodyPr>
+          <a:lstStyle/>
+          <a:p>
+            <a:r>
+              <a:rPr lang="en-US" sz="2200" b="1" dirty="0">
+                <a:solidFill>
+                  <a:srgbClr val="FF0000"/>
+                </a:solidFill>
+                <a:latin typeface="Calibri" panose="020F0502020204030204" pitchFamily="34" charset="0"/>
+                <a:cs typeface="Calibri" panose="020F0502020204030204" pitchFamily="34" charset="0"/>
+              </a:rPr>
+              <a:t>When you are done, please remember to upload your .html file to: </a:t>
+            </a:r>
+          </a:p>
+          <a:p>
+            <a:r>
+              <a:rPr lang="en-US" sz="2200" b="1" u="sng" dirty="0" err="1">
+                <a:solidFill>
+                  <a:srgbClr val="FF0000"/>
+                </a:solidFill>
+                <a:latin typeface="Calibri" panose="020F0502020204030204" pitchFamily="34" charset="0"/>
+                <a:cs typeface="Calibri" panose="020F0502020204030204" pitchFamily="34" charset="0"/>
+              </a:rPr>
+              <a:t>tinyurl.com</a:t>
+            </a:r>
+            <a:r>
+              <a:rPr lang="en-US" sz="2200" b="1" u="sng" dirty="0">
+                <a:solidFill>
+                  <a:srgbClr val="FF0000"/>
+                </a:solidFill>
+                <a:latin typeface="Calibri" panose="020F0502020204030204" pitchFamily="34" charset="0"/>
+                <a:cs typeface="Calibri" panose="020F0502020204030204" pitchFamily="34" charset="0"/>
+              </a:rPr>
+              <a:t>/</a:t>
+            </a:r>
+            <a:r>
+              <a:rPr lang="en-US" sz="2200" b="1" u="sng" dirty="0" err="1">
+                <a:solidFill>
+                  <a:srgbClr val="FF0000"/>
+                </a:solidFill>
+                <a:latin typeface="Calibri" panose="020F0502020204030204" pitchFamily="34" charset="0"/>
+                <a:cs typeface="Calibri" panose="020F0502020204030204" pitchFamily="34" charset="0"/>
+              </a:rPr>
+              <a:t>nanwpwbu</a:t>
+            </a:r>
+            <a:endParaRPr lang="en-US" sz="2200" b="1" u="sng" dirty="0">
+              <a:solidFill>
+                <a:srgbClr val="FF0000"/>
+              </a:solidFill>
+              <a:latin typeface="Calibri" panose="020F0502020204030204" pitchFamily="34" charset="0"/>
+              <a:cs typeface="Calibri" panose="020F0502020204030204" pitchFamily="34" charset="0"/>
+            </a:endParaRPr>
+          </a:p>
+          <a:p>
+            <a:endParaRPr lang="en-US" sz="2200" b="1" dirty="0">
+              <a:solidFill>
+                <a:srgbClr val="FF0000"/>
+              </a:solidFill>
+              <a:latin typeface="Calibri" panose="020F0502020204030204" pitchFamily="34" charset="0"/>
+              <a:cs typeface="Calibri" panose="020F0502020204030204" pitchFamily="34" charset="0"/>
+            </a:endParaRPr>
           </a:p>
         </p:txBody>
       </p:sp>
@@ -21827,7 +22123,186 @@
 </p:sld>
 </file>
 
+<file path=ppt/slides/slide39.xml><?xml version="1.0" encoding="utf-8"?>
+<p:sld xmlns:a="http://schemas.openxmlformats.org/drawingml/2006/main" xmlns:r="http://schemas.openxmlformats.org/officeDocument/2006/relationships" xmlns:p="http://schemas.openxmlformats.org/presentationml/2006/main">
+  <p:cSld>
+    <p:spTree>
+      <p:nvGrpSpPr>
+        <p:cNvPr id="1" name=""/>
+        <p:cNvGrpSpPr/>
+        <p:nvPr/>
+      </p:nvGrpSpPr>
+      <p:grpSpPr>
+        <a:xfrm>
+          <a:off x="0" y="0"/>
+          <a:ext cx="0" cy="0"/>
+          <a:chOff x="0" y="0"/>
+          <a:chExt cx="0" cy="0"/>
+        </a:xfrm>
+      </p:grpSpPr>
+      <p:sp>
+        <p:nvSpPr>
+          <p:cNvPr id="4" name="Rectangle 3">
+            <a:extLst>
+              <a:ext uri="{FF2B5EF4-FFF2-40B4-BE49-F238E27FC236}">
+                <a16:creationId xmlns:a16="http://schemas.microsoft.com/office/drawing/2014/main" id="{245526BC-242F-8349-A497-43863F6FD3A9}"/>
+              </a:ext>
+            </a:extLst>
+          </p:cNvPr>
+          <p:cNvSpPr/>
+          <p:nvPr/>
+        </p:nvSpPr>
+        <p:spPr>
+          <a:xfrm>
+            <a:off x="1887006" y="2551837"/>
+            <a:ext cx="8418010" cy="1754326"/>
+          </a:xfrm>
+          <a:prstGeom prst="rect">
+            <a:avLst/>
+          </a:prstGeom>
+          <a:noFill/>
+        </p:spPr>
+        <p:txBody>
+          <a:bodyPr wrap="none" lIns="91440" tIns="45720" rIns="91440" bIns="45720">
+            <a:spAutoFit/>
+          </a:bodyPr>
+          <a:lstStyle/>
+          <a:p>
+            <a:pPr algn="ctr"/>
+            <a:r>
+              <a:rPr lang="en-US" sz="5400" b="1" cap="none" spc="0" dirty="0">
+                <a:ln w="22225">
+                  <a:solidFill>
+                    <a:schemeClr val="accent2"/>
+                  </a:solidFill>
+                  <a:prstDash val="solid"/>
+                </a:ln>
+                <a:solidFill>
+                  <a:srgbClr val="FFC000"/>
+                </a:solidFill>
+                <a:effectLst/>
+              </a:rPr>
+              <a:t>&lt;Happy coding, everyone!/&gt;</a:t>
+            </a:r>
+          </a:p>
+          <a:p>
+            <a:pPr algn="ctr"/>
+            <a:r>
+              <a:rPr lang="en-US" sz="5400" b="1" cap="none" spc="0" dirty="0">
+                <a:ln w="22225">
+                  <a:solidFill>
+                    <a:schemeClr val="accent2"/>
+                  </a:solidFill>
+                  <a:prstDash val="solid"/>
+                </a:ln>
+                <a:solidFill>
+                  <a:srgbClr val="FFC000"/>
+                </a:solidFill>
+                <a:effectLst/>
+              </a:rPr>
+              <a:t>&lt;Thank you!/&gt;</a:t>
+            </a:r>
+          </a:p>
+        </p:txBody>
+      </p:sp>
+    </p:spTree>
+    <p:extLst>
+      <p:ext uri="{BB962C8B-B14F-4D97-AF65-F5344CB8AC3E}">
+        <p14:creationId xmlns:p14="http://schemas.microsoft.com/office/powerpoint/2010/main" val="484107034"/>
+      </p:ext>
+    </p:extLst>
+  </p:cSld>
+  <p:clrMapOvr>
+    <a:masterClrMapping/>
+  </p:clrMapOvr>
+</p:sld>
+</file>
+
 <file path=ppt/slides/slide4.xml><?xml version="1.0" encoding="utf-8"?>
+<p:sld xmlns:a="http://schemas.openxmlformats.org/drawingml/2006/main" xmlns:r="http://schemas.openxmlformats.org/officeDocument/2006/relationships" xmlns:p="http://schemas.openxmlformats.org/presentationml/2006/main">
+  <p:cSld>
+    <p:spTree>
+      <p:nvGrpSpPr>
+        <p:cNvPr id="1" name=""/>
+        <p:cNvGrpSpPr/>
+        <p:nvPr/>
+      </p:nvGrpSpPr>
+      <p:grpSpPr>
+        <a:xfrm>
+          <a:off x="0" y="0"/>
+          <a:ext cx="0" cy="0"/>
+          <a:chOff x="0" y="0"/>
+          <a:chExt cx="0" cy="0"/>
+        </a:xfrm>
+      </p:grpSpPr>
+      <p:sp>
+        <p:nvSpPr>
+          <p:cNvPr id="2" name="Title 1">
+            <a:extLst>
+              <a:ext uri="{FF2B5EF4-FFF2-40B4-BE49-F238E27FC236}">
+                <a16:creationId xmlns:a16="http://schemas.microsoft.com/office/drawing/2014/main" id="{98B80CAB-37EE-924F-937C-DFCA60B8A2EB}"/>
+              </a:ext>
+            </a:extLst>
+          </p:cNvPr>
+          <p:cNvSpPr>
+            <a:spLocks noGrp="1"/>
+          </p:cNvSpPr>
+          <p:nvPr>
+            <p:ph type="title"/>
+          </p:nvPr>
+        </p:nvSpPr>
+        <p:spPr/>
+        <p:txBody>
+          <a:bodyPr/>
+          <a:lstStyle/>
+          <a:p>
+            <a:endParaRPr lang="en-US"/>
+          </a:p>
+        </p:txBody>
+      </p:sp>
+      <p:pic>
+        <p:nvPicPr>
+          <p:cNvPr id="4" name="Content Placeholder 3">
+            <a:extLst>
+              <a:ext uri="{FF2B5EF4-FFF2-40B4-BE49-F238E27FC236}">
+                <a16:creationId xmlns:a16="http://schemas.microsoft.com/office/drawing/2014/main" id="{B8B71D6C-A802-B14D-AB45-7743BECA486F}"/>
+              </a:ext>
+            </a:extLst>
+          </p:cNvPr>
+          <p:cNvPicPr>
+            <a:picLocks noGrp="1" noChangeAspect="1"/>
+          </p:cNvPicPr>
+          <p:nvPr>
+            <p:ph idx="1"/>
+          </p:nvPr>
+        </p:nvPicPr>
+        <p:blipFill>
+          <a:blip r:embed="rId2"/>
+          <a:stretch>
+            <a:fillRect/>
+          </a:stretch>
+        </p:blipFill>
+        <p:spPr>
+          <a:xfrm>
+            <a:off x="3534911" y="877260"/>
+            <a:ext cx="5657166" cy="4627562"/>
+          </a:xfrm>
+        </p:spPr>
+      </p:pic>
+    </p:spTree>
+    <p:extLst>
+      <p:ext uri="{BB962C8B-B14F-4D97-AF65-F5344CB8AC3E}">
+        <p14:creationId xmlns:p14="http://schemas.microsoft.com/office/powerpoint/2010/main" val="3429237179"/>
+      </p:ext>
+    </p:extLst>
+  </p:cSld>
+  <p:clrMapOvr>
+    <a:masterClrMapping/>
+  </p:clrMapOvr>
+</p:sld>
+</file>
+
+<file path=ppt/slides/slide5.xml><?xml version="1.0" encoding="utf-8"?>
 <p:sld xmlns:a="http://schemas.openxmlformats.org/drawingml/2006/main" xmlns:r="http://schemas.openxmlformats.org/officeDocument/2006/relationships" xmlns:p="http://schemas.openxmlformats.org/presentationml/2006/main">
   <p:cSld>
     <p:spTree>
@@ -21973,7 +22448,7 @@
 </p:sld>
 </file>
 
-<file path=ppt/slides/slide5.xml><?xml version="1.0" encoding="utf-8"?>
+<file path=ppt/slides/slide6.xml><?xml version="1.0" encoding="utf-8"?>
 <p:sld xmlns:a="http://schemas.openxmlformats.org/drawingml/2006/main" xmlns:r="http://schemas.openxmlformats.org/officeDocument/2006/relationships" xmlns:p="http://schemas.openxmlformats.org/presentationml/2006/main">
   <p:cSld>
     <p:spTree>
@@ -25779,7 +26254,7 @@
 </p:sld>
 </file>
 
-<file path=ppt/slides/slide6.xml><?xml version="1.0" encoding="utf-8"?>
+<file path=ppt/slides/slide7.xml><?xml version="1.0" encoding="utf-8"?>
 <p:sld xmlns:a="http://schemas.openxmlformats.org/drawingml/2006/main" xmlns:r="http://schemas.openxmlformats.org/officeDocument/2006/relationships" xmlns:p="http://schemas.openxmlformats.org/presentationml/2006/main">
   <p:cSld>
     <p:spTree>
@@ -26257,7 +26732,7 @@
 </p:sld>
 </file>
 
-<file path=ppt/slides/slide7.xml><?xml version="1.0" encoding="utf-8"?>
+<file path=ppt/slides/slide8.xml><?xml version="1.0" encoding="utf-8"?>
 <p:sld xmlns:a="http://schemas.openxmlformats.org/drawingml/2006/main" xmlns:r="http://schemas.openxmlformats.org/officeDocument/2006/relationships" xmlns:p="http://schemas.openxmlformats.org/presentationml/2006/main">
   <p:cSld>
     <p:spTree>
@@ -26812,7 +27287,7 @@
 </p:sld>
 </file>
 
-<file path=ppt/slides/slide8.xml><?xml version="1.0" encoding="utf-8"?>
+<file path=ppt/slides/slide9.xml><?xml version="1.0" encoding="utf-8"?>
 <p:sld xmlns:a="http://schemas.openxmlformats.org/drawingml/2006/main" xmlns:r="http://schemas.openxmlformats.org/officeDocument/2006/relationships" xmlns:p="http://schemas.openxmlformats.org/presentationml/2006/main">
   <p:cSld>
     <p:spTree>
@@ -27067,144 +27542,6 @@
         </p:spPr>
       </p:pic>
     </p:spTree>
-  </p:cSld>
-  <p:clrMapOvr>
-    <a:masterClrMapping/>
-  </p:clrMapOvr>
-</p:sld>
-</file>
-
-<file path=ppt/slides/slide9.xml><?xml version="1.0" encoding="utf-8"?>
-<p:sld xmlns:a="http://schemas.openxmlformats.org/drawingml/2006/main" xmlns:r="http://schemas.openxmlformats.org/officeDocument/2006/relationships" xmlns:p="http://schemas.openxmlformats.org/presentationml/2006/main">
-  <p:cSld>
-    <p:spTree>
-      <p:nvGrpSpPr>
-        <p:cNvPr id="1" name=""/>
-        <p:cNvGrpSpPr/>
-        <p:nvPr/>
-      </p:nvGrpSpPr>
-      <p:grpSpPr>
-        <a:xfrm>
-          <a:off x="0" y="0"/>
-          <a:ext cx="0" cy="0"/>
-          <a:chOff x="0" y="0"/>
-          <a:chExt cx="0" cy="0"/>
-        </a:xfrm>
-      </p:grpSpPr>
-      <p:sp>
-        <p:nvSpPr>
-          <p:cNvPr id="2" name="Title 1">
-            <a:extLst>
-              <a:ext uri="{FF2B5EF4-FFF2-40B4-BE49-F238E27FC236}">
-                <a16:creationId xmlns:a16="http://schemas.microsoft.com/office/drawing/2014/main" id="{C830DE6B-7B18-4540-9CB8-57591715AEC7}"/>
-              </a:ext>
-            </a:extLst>
-          </p:cNvPr>
-          <p:cNvSpPr>
-            <a:spLocks noGrp="1"/>
-          </p:cNvSpPr>
-          <p:nvPr>
-            <p:ph type="title"/>
-          </p:nvPr>
-        </p:nvSpPr>
-        <p:spPr/>
-        <p:txBody>
-          <a:bodyPr/>
-          <a:lstStyle/>
-          <a:p>
-            <a:r>
-              <a:rPr lang="en-US" dirty="0"/>
-              <a:t>Resources</a:t>
-            </a:r>
-          </a:p>
-        </p:txBody>
-      </p:sp>
-      <p:sp>
-        <p:nvSpPr>
-          <p:cNvPr id="3" name="Content Placeholder 2">
-            <a:extLst>
-              <a:ext uri="{FF2B5EF4-FFF2-40B4-BE49-F238E27FC236}">
-                <a16:creationId xmlns:a16="http://schemas.microsoft.com/office/drawing/2014/main" id="{0CD1B559-2E43-4540-AC02-8BA39354E8EE}"/>
-              </a:ext>
-            </a:extLst>
-          </p:cNvPr>
-          <p:cNvSpPr>
-            <a:spLocks noGrp="1"/>
-          </p:cNvSpPr>
-          <p:nvPr>
-            <p:ph idx="1"/>
-          </p:nvPr>
-        </p:nvSpPr>
-        <p:spPr>
-          <a:xfrm>
-            <a:off x="1371599" y="1544596"/>
-            <a:ext cx="9984259" cy="3449436"/>
-          </a:xfrm>
-        </p:spPr>
-        <p:txBody>
-          <a:bodyPr/>
-          <a:lstStyle/>
-          <a:p>
-            <a:r>
-              <a:rPr lang="en-US" dirty="0"/>
-              <a:t>Online code editors:</a:t>
-            </a:r>
-          </a:p>
-          <a:p>
-            <a:pPr lvl="1"/>
-            <a:r>
-              <a:rPr lang="en-US" dirty="0" err="1"/>
-              <a:t>codepen.io</a:t>
-            </a:r>
-            <a:endParaRPr lang="en-US" dirty="0"/>
-          </a:p>
-          <a:p>
-            <a:pPr lvl="1"/>
-            <a:r>
-              <a:rPr lang="en-US" dirty="0" err="1"/>
-              <a:t>replit.com</a:t>
-            </a:r>
-            <a:endParaRPr lang="en-US" dirty="0"/>
-          </a:p>
-          <a:p>
-            <a:r>
-              <a:rPr lang="en-US" dirty="0"/>
-              <a:t>Documentation References:</a:t>
-            </a:r>
-          </a:p>
-          <a:p>
-            <a:pPr lvl="1"/>
-            <a:r>
-              <a:rPr lang="en-US" dirty="0"/>
-              <a:t>w3schools.com</a:t>
-            </a:r>
-          </a:p>
-          <a:p>
-            <a:pPr lvl="1"/>
-            <a:r>
-              <a:rPr lang="en-US" dirty="0" err="1"/>
-              <a:t>codecademy.com</a:t>
-            </a:r>
-            <a:endParaRPr lang="en-US" dirty="0"/>
-          </a:p>
-          <a:p>
-            <a:pPr lvl="1"/>
-            <a:r>
-              <a:rPr lang="en-US" dirty="0"/>
-              <a:t>MDN JS Web Docs</a:t>
-            </a:r>
-          </a:p>
-          <a:p>
-            <a:endParaRPr lang="en-US" dirty="0"/>
-          </a:p>
-        </p:txBody>
-      </p:sp>
-    </p:spTree>
-    <p:extLst>
-      <p:ext uri="{BB962C8B-B14F-4D97-AF65-F5344CB8AC3E}">
-        <p14:creationId xmlns:p14="http://schemas.microsoft.com/office/powerpoint/2010/main" val="816834961"/>
-      </p:ext>
-    </p:extLst>
   </p:cSld>
   <p:clrMapOvr>
     <a:masterClrMapping/>

</xml_diff>